<commit_message>
add function sort_test_choice print screen
</commit_message>
<xml_diff>
--- a/documents/Presentation.pptx
+++ b/documents/Presentation.pptx
@@ -296,7 +296,7 @@
           <a:p>
             <a:fld id="{C920219A-2CBD-4FB9-A054-C0A8754EF5D7}" type="datetimeFigureOut">
               <a:rPr lang="de-CH" smtClean="0"/>
-              <a:t>27.05.2023</a:t>
+              <a:t>31.05.2023</a:t>
             </a:fld>
             <a:endParaRPr lang="de-CH" dirty="0"/>
           </a:p>
@@ -496,7 +496,7 @@
           <a:p>
             <a:fld id="{C920219A-2CBD-4FB9-A054-C0A8754EF5D7}" type="datetimeFigureOut">
               <a:rPr lang="de-CH" smtClean="0"/>
-              <a:t>27.05.2023</a:t>
+              <a:t>31.05.2023</a:t>
             </a:fld>
             <a:endParaRPr lang="de-CH" dirty="0"/>
           </a:p>
@@ -706,7 +706,7 @@
           <a:p>
             <a:fld id="{C920219A-2CBD-4FB9-A054-C0A8754EF5D7}" type="datetimeFigureOut">
               <a:rPr lang="de-CH" smtClean="0"/>
-              <a:t>27.05.2023</a:t>
+              <a:t>31.05.2023</a:t>
             </a:fld>
             <a:endParaRPr lang="de-CH" dirty="0"/>
           </a:p>
@@ -906,7 +906,7 @@
           <a:p>
             <a:fld id="{C920219A-2CBD-4FB9-A054-C0A8754EF5D7}" type="datetimeFigureOut">
               <a:rPr lang="de-CH" smtClean="0"/>
-              <a:t>27.05.2023</a:t>
+              <a:t>31.05.2023</a:t>
             </a:fld>
             <a:endParaRPr lang="de-CH" dirty="0"/>
           </a:p>
@@ -1182,7 +1182,7 @@
           <a:p>
             <a:fld id="{C920219A-2CBD-4FB9-A054-C0A8754EF5D7}" type="datetimeFigureOut">
               <a:rPr lang="de-CH" smtClean="0"/>
-              <a:t>27.05.2023</a:t>
+              <a:t>31.05.2023</a:t>
             </a:fld>
             <a:endParaRPr lang="de-CH" dirty="0"/>
           </a:p>
@@ -1450,7 +1450,7 @@
           <a:p>
             <a:fld id="{C920219A-2CBD-4FB9-A054-C0A8754EF5D7}" type="datetimeFigureOut">
               <a:rPr lang="de-CH" smtClean="0"/>
-              <a:t>27.05.2023</a:t>
+              <a:t>31.05.2023</a:t>
             </a:fld>
             <a:endParaRPr lang="de-CH" dirty="0"/>
           </a:p>
@@ -1865,7 +1865,7 @@
           <a:p>
             <a:fld id="{C920219A-2CBD-4FB9-A054-C0A8754EF5D7}" type="datetimeFigureOut">
               <a:rPr lang="de-CH" smtClean="0"/>
-              <a:t>27.05.2023</a:t>
+              <a:t>31.05.2023</a:t>
             </a:fld>
             <a:endParaRPr lang="de-CH" dirty="0"/>
           </a:p>
@@ -2007,7 +2007,7 @@
           <a:p>
             <a:fld id="{C920219A-2CBD-4FB9-A054-C0A8754EF5D7}" type="datetimeFigureOut">
               <a:rPr lang="de-CH" smtClean="0"/>
-              <a:t>27.05.2023</a:t>
+              <a:t>31.05.2023</a:t>
             </a:fld>
             <a:endParaRPr lang="de-CH" dirty="0"/>
           </a:p>
@@ -2120,7 +2120,7 @@
           <a:p>
             <a:fld id="{C920219A-2CBD-4FB9-A054-C0A8754EF5D7}" type="datetimeFigureOut">
               <a:rPr lang="de-CH" smtClean="0"/>
-              <a:t>27.05.2023</a:t>
+              <a:t>31.05.2023</a:t>
             </a:fld>
             <a:endParaRPr lang="de-CH" dirty="0"/>
           </a:p>
@@ -2433,7 +2433,7 @@
           <a:p>
             <a:fld id="{C920219A-2CBD-4FB9-A054-C0A8754EF5D7}" type="datetimeFigureOut">
               <a:rPr lang="de-CH" smtClean="0"/>
-              <a:t>27.05.2023</a:t>
+              <a:t>31.05.2023</a:t>
             </a:fld>
             <a:endParaRPr lang="de-CH" dirty="0"/>
           </a:p>
@@ -2722,7 +2722,7 @@
           <a:p>
             <a:fld id="{C920219A-2CBD-4FB9-A054-C0A8754EF5D7}" type="datetimeFigureOut">
               <a:rPr lang="de-CH" smtClean="0"/>
-              <a:t>27.05.2023</a:t>
+              <a:t>31.05.2023</a:t>
             </a:fld>
             <a:endParaRPr lang="de-CH" dirty="0"/>
           </a:p>
@@ -2968,7 +2968,7 @@
           <a:p>
             <a:fld id="{C920219A-2CBD-4FB9-A054-C0A8754EF5D7}" type="datetimeFigureOut">
               <a:rPr lang="de-CH" smtClean="0"/>
-              <a:t>27.05.2023</a:t>
+              <a:t>31.05.2023</a:t>
             </a:fld>
             <a:endParaRPr lang="de-CH" dirty="0"/>
           </a:p>
@@ -7344,6 +7344,36 @@
           </a:p>
         </p:txBody>
       </p:sp>
+      <p:pic>
+        <p:nvPicPr>
+          <p:cNvPr id="4" name="Picture 3">
+            <a:extLst>
+              <a:ext uri="{FF2B5EF4-FFF2-40B4-BE49-F238E27FC236}">
+                <a16:creationId xmlns:a16="http://schemas.microsoft.com/office/drawing/2014/main" id="{B9D7A8E3-BFF4-52F7-6816-F0EE11BD7C6E}"/>
+              </a:ext>
+            </a:extLst>
+          </p:cNvPr>
+          <p:cNvPicPr>
+            <a:picLocks noChangeAspect="1"/>
+          </p:cNvPicPr>
+          <p:nvPr/>
+        </p:nvPicPr>
+        <p:blipFill>
+          <a:blip r:embed="rId3"/>
+          <a:stretch>
+            <a:fillRect/>
+          </a:stretch>
+        </p:blipFill>
+        <p:spPr>
+          <a:xfrm>
+            <a:off x="4899279" y="3664861"/>
+            <a:ext cx="6505901" cy="1839124"/>
+          </a:xfrm>
+          <a:prstGeom prst="rect">
+            <a:avLst/>
+          </a:prstGeom>
+        </p:spPr>
+      </p:pic>
     </p:spTree>
     <p:extLst>
       <p:ext uri="{BB962C8B-B14F-4D97-AF65-F5344CB8AC3E}">
@@ -7354,6 +7384,81 @@
   <p:clrMapOvr>
     <a:masterClrMapping/>
   </p:clrMapOvr>
+  <p:timing>
+    <p:tnLst>
+      <p:par>
+        <p:cTn id="1" dur="indefinite" restart="never" nodeType="tmRoot">
+          <p:childTnLst>
+            <p:seq concurrent="1" nextAc="seek">
+              <p:cTn id="2" dur="indefinite" nodeType="mainSeq">
+                <p:childTnLst>
+                  <p:par>
+                    <p:cTn id="3" fill="hold">
+                      <p:stCondLst>
+                        <p:cond delay="indefinite"/>
+                      </p:stCondLst>
+                      <p:childTnLst>
+                        <p:par>
+                          <p:cTn id="4" fill="hold">
+                            <p:stCondLst>
+                              <p:cond delay="0"/>
+                            </p:stCondLst>
+                            <p:childTnLst>
+                              <p:par>
+                                <p:cTn id="5" presetID="1" presetClass="entr" presetSubtype="0" fill="hold" nodeType="clickEffect">
+                                  <p:stCondLst>
+                                    <p:cond delay="0"/>
+                                  </p:stCondLst>
+                                  <p:childTnLst>
+                                    <p:set>
+                                      <p:cBhvr>
+                                        <p:cTn id="6" dur="1" fill="hold">
+                                          <p:stCondLst>
+                                            <p:cond delay="0"/>
+                                          </p:stCondLst>
+                                        </p:cTn>
+                                        <p:tgtEl>
+                                          <p:spTgt spid="4"/>
+                                        </p:tgtEl>
+                                        <p:attrNameLst>
+                                          <p:attrName>style.visibility</p:attrName>
+                                        </p:attrNameLst>
+                                      </p:cBhvr>
+                                      <p:to>
+                                        <p:strVal val="visible"/>
+                                      </p:to>
+                                    </p:set>
+                                  </p:childTnLst>
+                                </p:cTn>
+                              </p:par>
+                            </p:childTnLst>
+                          </p:cTn>
+                        </p:par>
+                      </p:childTnLst>
+                    </p:cTn>
+                  </p:par>
+                </p:childTnLst>
+              </p:cTn>
+              <p:prevCondLst>
+                <p:cond evt="onPrev" delay="0">
+                  <p:tgtEl>
+                    <p:sldTgt/>
+                  </p:tgtEl>
+                </p:cond>
+              </p:prevCondLst>
+              <p:nextCondLst>
+                <p:cond evt="onNext" delay="0">
+                  <p:tgtEl>
+                    <p:sldTgt/>
+                  </p:tgtEl>
+                </p:cond>
+              </p:nextCondLst>
+            </p:seq>
+          </p:childTnLst>
+        </p:cTn>
+      </p:par>
+    </p:tnLst>
+  </p:timing>
 </p:sld>
 </file>
 

</xml_diff>